<commit_message>
added plots of best resutls
</commit_message>
<xml_diff>
--- a/Presentation_Homework_2.pptx
+++ b/Presentation_Homework_2.pptx
@@ -12,7 +12,10 @@
     <p:sldId id="261" r:id="rId6"/>
     <p:sldId id="262" r:id="rId7"/>
     <p:sldId id="263" r:id="rId8"/>
-    <p:sldId id="264" r:id="rId9"/>
+    <p:sldId id="265" r:id="rId9"/>
+    <p:sldId id="266" r:id="rId10"/>
+    <p:sldId id="267" r:id="rId11"/>
+    <p:sldId id="264" r:id="rId12"/>
   </p:sldIdLst>
   <p:sldSz cx="12192000" cy="6858000"/>
   <p:notesSz cx="6858000" cy="9144000"/>
@@ -288,7 +291,7 @@
           <a:p>
             <a:fld id="{646869EA-C98A-4D97-B682-A934C44B0CC9}" type="datetimeFigureOut">
               <a:rPr lang="en-US" smtClean="0"/>
-              <a:t>2/25/2020</a:t>
+              <a:t>2/26/2020</a:t>
             </a:fld>
             <a:endParaRPr lang="en-US"/>
           </a:p>
@@ -618,7 +621,7 @@
           <a:p>
             <a:fld id="{646869EA-C98A-4D97-B682-A934C44B0CC9}" type="datetimeFigureOut">
               <a:rPr lang="en-US" smtClean="0"/>
-              <a:t>2/25/2020</a:t>
+              <a:t>2/26/2020</a:t>
             </a:fld>
             <a:endParaRPr lang="en-US"/>
           </a:p>
@@ -798,7 +801,7 @@
           <a:p>
             <a:fld id="{646869EA-C98A-4D97-B682-A934C44B0CC9}" type="datetimeFigureOut">
               <a:rPr lang="en-US" smtClean="0"/>
-              <a:t>2/25/2020</a:t>
+              <a:t>2/26/2020</a:t>
             </a:fld>
             <a:endParaRPr lang="en-US"/>
           </a:p>
@@ -968,7 +971,7 @@
           <a:p>
             <a:fld id="{646869EA-C98A-4D97-B682-A934C44B0CC9}" type="datetimeFigureOut">
               <a:rPr lang="en-US" smtClean="0"/>
-              <a:t>2/25/2020</a:t>
+              <a:t>2/26/2020</a:t>
             </a:fld>
             <a:endParaRPr lang="en-US"/>
           </a:p>
@@ -1245,7 +1248,7 @@
           <a:p>
             <a:fld id="{646869EA-C98A-4D97-B682-A934C44B0CC9}" type="datetimeFigureOut">
               <a:rPr lang="en-US" smtClean="0"/>
-              <a:t>2/25/2020</a:t>
+              <a:t>2/26/2020</a:t>
             </a:fld>
             <a:endParaRPr lang="en-US"/>
           </a:p>
@@ -1639,7 +1642,7 @@
           <a:p>
             <a:fld id="{646869EA-C98A-4D97-B682-A934C44B0CC9}" type="datetimeFigureOut">
               <a:rPr lang="en-US" smtClean="0"/>
-              <a:t>2/25/2020</a:t>
+              <a:t>2/26/2020</a:t>
             </a:fld>
             <a:endParaRPr lang="en-US"/>
           </a:p>
@@ -2116,7 +2119,7 @@
           <a:p>
             <a:fld id="{646869EA-C98A-4D97-B682-A934C44B0CC9}" type="datetimeFigureOut">
               <a:rPr lang="en-US" smtClean="0"/>
-              <a:t>2/25/2020</a:t>
+              <a:t>2/26/2020</a:t>
             </a:fld>
             <a:endParaRPr lang="en-US"/>
           </a:p>
@@ -2234,7 +2237,7 @@
           <a:p>
             <a:fld id="{646869EA-C98A-4D97-B682-A934C44B0CC9}" type="datetimeFigureOut">
               <a:rPr lang="en-US" smtClean="0"/>
-              <a:t>2/25/2020</a:t>
+              <a:t>2/26/2020</a:t>
             </a:fld>
             <a:endParaRPr lang="en-US"/>
           </a:p>
@@ -2329,7 +2332,7 @@
           <a:p>
             <a:fld id="{646869EA-C98A-4D97-B682-A934C44B0CC9}" type="datetimeFigureOut">
               <a:rPr lang="en-US" smtClean="0"/>
-              <a:t>2/25/2020</a:t>
+              <a:t>2/26/2020</a:t>
             </a:fld>
             <a:endParaRPr lang="en-US"/>
           </a:p>
@@ -2675,7 +2678,7 @@
           <a:p>
             <a:fld id="{646869EA-C98A-4D97-B682-A934C44B0CC9}" type="datetimeFigureOut">
               <a:rPr lang="en-US" smtClean="0"/>
-              <a:t>2/25/2020</a:t>
+              <a:t>2/26/2020</a:t>
             </a:fld>
             <a:endParaRPr lang="en-US"/>
           </a:p>
@@ -3063,7 +3066,7 @@
           <a:p>
             <a:fld id="{646869EA-C98A-4D97-B682-A934C44B0CC9}" type="datetimeFigureOut">
               <a:rPr lang="en-US" smtClean="0"/>
-              <a:t>2/25/2020</a:t>
+              <a:t>2/26/2020</a:t>
             </a:fld>
             <a:endParaRPr lang="en-US"/>
           </a:p>
@@ -3341,7 +3344,7 @@
           <a:p>
             <a:fld id="{646869EA-C98A-4D97-B682-A934C44B0CC9}" type="datetimeFigureOut">
               <a:rPr lang="en-US" smtClean="0"/>
-              <a:t>2/25/2020</a:t>
+              <a:t>2/26/2020</a:t>
             </a:fld>
             <a:endParaRPr lang="en-US"/>
           </a:p>
@@ -3937,6 +3940,282 @@
 </p:sld>
 </file>
 
+<file path=ppt/slides/slide10.xml><?xml version="1.0" encoding="utf-8"?>
+<p:sld xmlns:a="http://schemas.openxmlformats.org/drawingml/2006/main" xmlns:r="http://schemas.openxmlformats.org/officeDocument/2006/relationships" xmlns:p="http://schemas.openxmlformats.org/presentationml/2006/main">
+  <p:cSld>
+    <p:spTree>
+      <p:nvGrpSpPr>
+        <p:cNvPr id="1" name=""/>
+        <p:cNvGrpSpPr/>
+        <p:nvPr/>
+      </p:nvGrpSpPr>
+      <p:grpSpPr>
+        <a:xfrm>
+          <a:off x="0" y="0"/>
+          <a:ext cx="0" cy="0"/>
+          <a:chOff x="0" y="0"/>
+          <a:chExt cx="0" cy="0"/>
+        </a:xfrm>
+      </p:grpSpPr>
+      <p:sp>
+        <p:nvSpPr>
+          <p:cNvPr id="5" name="Title 1"/>
+          <p:cNvSpPr txBox="1">
+            <a:spLocks/>
+          </p:cNvSpPr>
+          <p:nvPr/>
+        </p:nvSpPr>
+        <p:spPr>
+          <a:xfrm>
+            <a:off x="1574800" y="520700"/>
+            <a:ext cx="9601200" cy="774700"/>
+          </a:xfrm>
+          <a:prstGeom prst="rect">
+            <a:avLst/>
+          </a:prstGeom>
+        </p:spPr>
+        <p:txBody>
+          <a:bodyPr vert="horz" lIns="91440" tIns="45720" rIns="91440" bIns="45720" rtlCol="0" anchor="t">
+            <a:normAutofit/>
+          </a:bodyPr>
+          <a:lstStyle>
+            <a:lvl1pPr algn="l" defTabSz="914400" rtl="0" eaLnBrk="1" latinLnBrk="0" hangingPunct="1">
+              <a:lnSpc>
+                <a:spcPct val="89000"/>
+              </a:lnSpc>
+              <a:spcBef>
+                <a:spcPct val="0"/>
+              </a:spcBef>
+              <a:buNone/>
+              <a:defRPr sz="4400" kern="1200" baseline="0">
+                <a:solidFill>
+                  <a:schemeClr val="tx2"/>
+                </a:solidFill>
+                <a:latin typeface="+mj-lt"/>
+                <a:ea typeface="+mj-ea"/>
+                <a:cs typeface="+mj-cs"/>
+              </a:defRPr>
+            </a:lvl1pPr>
+          </a:lstStyle>
+          <a:p>
+            <a:r>
+              <a:rPr lang="en-US" dirty="0" smtClean="0"/>
+              <a:t>Best Solution Graphs For </a:t>
+            </a:r>
+            <a:r>
+              <a:rPr lang="en-US" dirty="0" err="1" smtClean="0"/>
+              <a:t>Reinelt</a:t>
+            </a:r>
+            <a:r>
+              <a:rPr lang="en-US" dirty="0" smtClean="0"/>
+              <a:t> 1323</a:t>
+            </a:r>
+            <a:endParaRPr lang="en-US" dirty="0"/>
+          </a:p>
+        </p:txBody>
+      </p:sp>
+      <p:pic>
+        <p:nvPicPr>
+          <p:cNvPr id="10" name="Picture 9"/>
+          <p:cNvPicPr>
+            <a:picLocks noChangeAspect="1"/>
+          </p:cNvPicPr>
+          <p:nvPr/>
+        </p:nvPicPr>
+        <p:blipFill rotWithShape="1">
+          <a:blip r:embed="rId2"/>
+          <a:srcRect l="16251" t="18765" r="16145" b="9896"/>
+          <a:stretch/>
+        </p:blipFill>
+        <p:spPr>
+          <a:xfrm>
+            <a:off x="123334" y="2476500"/>
+            <a:ext cx="5970098" cy="3403600"/>
+          </a:xfrm>
+          <a:prstGeom prst="rect">
+            <a:avLst/>
+          </a:prstGeom>
+        </p:spPr>
+      </p:pic>
+      <p:pic>
+        <p:nvPicPr>
+          <p:cNvPr id="11" name="Picture 10"/>
+          <p:cNvPicPr>
+            <a:picLocks noChangeAspect="1"/>
+          </p:cNvPicPr>
+          <p:nvPr/>
+        </p:nvPicPr>
+        <p:blipFill rotWithShape="1">
+          <a:blip r:embed="rId3"/>
+          <a:srcRect l="16042" t="18957" r="15833" b="9704"/>
+          <a:stretch/>
+        </p:blipFill>
+        <p:spPr>
+          <a:xfrm>
+            <a:off x="6093432" y="2476500"/>
+            <a:ext cx="5983140" cy="3384957"/>
+          </a:xfrm>
+          <a:prstGeom prst="rect">
+            <a:avLst/>
+          </a:prstGeom>
+        </p:spPr>
+      </p:pic>
+      <p:sp>
+        <p:nvSpPr>
+          <p:cNvPr id="12" name="TextBox 11"/>
+          <p:cNvSpPr txBox="1"/>
+          <p:nvPr/>
+        </p:nvSpPr>
+        <p:spPr>
+          <a:xfrm>
+            <a:off x="2628900" y="1701800"/>
+            <a:ext cx="7540206" cy="646331"/>
+          </a:xfrm>
+          <a:prstGeom prst="rect">
+            <a:avLst/>
+          </a:prstGeom>
+          <a:noFill/>
+        </p:spPr>
+        <p:txBody>
+          <a:bodyPr wrap="none" rtlCol="0">
+            <a:spAutoFit/>
+          </a:bodyPr>
+          <a:lstStyle/>
+          <a:p>
+            <a:r>
+              <a:rPr lang="en-US" sz="3600" dirty="0" smtClean="0"/>
+              <a:t>Ordinal 		    vs 			Path</a:t>
+            </a:r>
+            <a:endParaRPr lang="en-US" sz="3600" dirty="0"/>
+          </a:p>
+        </p:txBody>
+      </p:sp>
+    </p:spTree>
+    <p:extLst>
+      <p:ext uri="{BB962C8B-B14F-4D97-AF65-F5344CB8AC3E}">
+        <p14:creationId xmlns:p14="http://schemas.microsoft.com/office/powerpoint/2010/main" val="3183156299"/>
+      </p:ext>
+    </p:extLst>
+  </p:cSld>
+  <p:clrMapOvr>
+    <a:masterClrMapping/>
+  </p:clrMapOvr>
+</p:sld>
+</file>
+
+<file path=ppt/slides/slide11.xml><?xml version="1.0" encoding="utf-8"?>
+<p:sld xmlns:a="http://schemas.openxmlformats.org/drawingml/2006/main" xmlns:r="http://schemas.openxmlformats.org/officeDocument/2006/relationships" xmlns:p="http://schemas.openxmlformats.org/presentationml/2006/main">
+  <p:cSld>
+    <p:spTree>
+      <p:nvGrpSpPr>
+        <p:cNvPr id="1" name=""/>
+        <p:cNvGrpSpPr/>
+        <p:nvPr/>
+      </p:nvGrpSpPr>
+      <p:grpSpPr>
+        <a:xfrm>
+          <a:off x="0" y="0"/>
+          <a:ext cx="0" cy="0"/>
+          <a:chOff x="0" y="0"/>
+          <a:chExt cx="0" cy="0"/>
+        </a:xfrm>
+      </p:grpSpPr>
+      <p:sp>
+        <p:nvSpPr>
+          <p:cNvPr id="2" name="Title 1"/>
+          <p:cNvSpPr>
+            <a:spLocks noGrp="1"/>
+          </p:cNvSpPr>
+          <p:nvPr>
+            <p:ph type="title"/>
+          </p:nvPr>
+        </p:nvSpPr>
+        <p:spPr/>
+        <p:txBody>
+          <a:bodyPr/>
+          <a:lstStyle/>
+          <a:p>
+            <a:r>
+              <a:rPr lang="en-US" dirty="0" smtClean="0"/>
+              <a:t>References</a:t>
+            </a:r>
+            <a:endParaRPr lang="en-US" dirty="0"/>
+          </a:p>
+        </p:txBody>
+      </p:sp>
+      <p:sp>
+        <p:nvSpPr>
+          <p:cNvPr id="3" name="Content Placeholder 2"/>
+          <p:cNvSpPr>
+            <a:spLocks noGrp="1"/>
+          </p:cNvSpPr>
+          <p:nvPr>
+            <p:ph idx="1"/>
+          </p:nvPr>
+        </p:nvSpPr>
+        <p:spPr/>
+        <p:txBody>
+          <a:bodyPr/>
+          <a:lstStyle/>
+          <a:p>
+            <a:r>
+              <a:rPr lang="en-US" dirty="0"/>
+              <a:t>[1] Hal Stringer &amp; Annie Wu (2004). “A Teaching GA” [Computer software]. Florida, Orlando: UCF.</a:t>
+            </a:r>
+          </a:p>
+          <a:p>
+            <a:r>
+              <a:rPr lang="en-US" dirty="0"/>
+              <a:t>[2] Applegate, D. L.; Bixby, R. M.; </a:t>
+            </a:r>
+            <a:r>
+              <a:rPr lang="en-US" dirty="0" err="1"/>
+              <a:t>Chvatal</a:t>
+            </a:r>
+            <a:r>
+              <a:rPr lang="en-US" dirty="0"/>
+              <a:t>, V.; Cook, W. J. (2006), “The Traveling Salesman Problem”, ISBN 978-0-691-12993-8.</a:t>
+            </a:r>
+          </a:p>
+          <a:p>
+            <a:r>
+              <a:rPr lang="en-US" dirty="0"/>
+              <a:t>[3] </a:t>
+            </a:r>
+            <a:r>
+              <a:rPr lang="en-US" dirty="0" err="1"/>
+              <a:t>Larranaga</a:t>
+            </a:r>
+            <a:r>
+              <a:rPr lang="en-US" dirty="0"/>
+              <a:t>, P. (1999). “Genetic Algorithms for the Travelling Salesman Problem: A Review of Representations and Operators”. Retrieved February 19, 2020, from </a:t>
+            </a:r>
+            <a:r>
+              <a:rPr lang="en-US" u="sng" dirty="0">
+                <a:hlinkClick r:id="rId2"/>
+              </a:rPr>
+              <a:t>https://link.springer.com/article/10.1023/A:1006529012972</a:t>
+            </a:r>
+            <a:endParaRPr lang="en-US" dirty="0"/>
+          </a:p>
+          <a:p>
+            <a:endParaRPr lang="en-US" dirty="0"/>
+          </a:p>
+        </p:txBody>
+      </p:sp>
+    </p:spTree>
+    <p:extLst>
+      <p:ext uri="{BB962C8B-B14F-4D97-AF65-F5344CB8AC3E}">
+        <p14:creationId xmlns:p14="http://schemas.microsoft.com/office/powerpoint/2010/main" val="2060100588"/>
+      </p:ext>
+    </p:extLst>
+  </p:cSld>
+  <p:clrMapOvr>
+    <a:masterClrMapping/>
+  </p:clrMapOvr>
+</p:sld>
+</file>
+
 <file path=ppt/slides/slide2.xml><?xml version="1.0" encoding="utf-8"?>
 <p:sld xmlns:a="http://schemas.openxmlformats.org/drawingml/2006/main" xmlns:r="http://schemas.openxmlformats.org/officeDocument/2006/relationships" xmlns:p="http://schemas.openxmlformats.org/presentationml/2006/main">
   <p:cSld>
@@ -5367,83 +5646,259 @@
             <p:ph type="title"/>
           </p:nvPr>
         </p:nvSpPr>
-        <p:spPr/>
+        <p:spPr>
+          <a:xfrm>
+            <a:off x="1574800" y="520700"/>
+            <a:ext cx="9601200" cy="774700"/>
+          </a:xfrm>
+        </p:spPr>
         <p:txBody>
           <a:bodyPr/>
           <a:lstStyle/>
           <a:p>
             <a:r>
               <a:rPr lang="en-US" dirty="0" smtClean="0"/>
-              <a:t>References</a:t>
+              <a:t>Best Solution Graphs For 48 Capitals</a:t>
             </a:r>
             <a:endParaRPr lang="en-US" dirty="0"/>
           </a:p>
         </p:txBody>
       </p:sp>
-      <p:sp>
-        <p:nvSpPr>
-          <p:cNvPr id="3" name="Content Placeholder 2"/>
-          <p:cNvSpPr>
-            <a:spLocks noGrp="1"/>
-          </p:cNvSpPr>
-          <p:nvPr>
-            <p:ph idx="1"/>
-          </p:nvPr>
-        </p:nvSpPr>
-        <p:spPr/>
-        <p:txBody>
-          <a:bodyPr/>
+      <p:pic>
+        <p:nvPicPr>
+          <p:cNvPr id="3" name="Picture 2"/>
+          <p:cNvPicPr>
+            <a:picLocks noChangeAspect="1"/>
+          </p:cNvPicPr>
+          <p:nvPr/>
+        </p:nvPicPr>
+        <p:blipFill rotWithShape="1">
+          <a:blip r:embed="rId2"/>
+          <a:srcRect l="16354" t="18765" r="15833" b="10089"/>
+          <a:stretch/>
+        </p:blipFill>
+        <p:spPr>
+          <a:xfrm>
+            <a:off x="123335" y="2476500"/>
+            <a:ext cx="6027129" cy="3416299"/>
+          </a:xfrm>
+          <a:prstGeom prst="rect">
+            <a:avLst/>
+          </a:prstGeom>
+        </p:spPr>
+      </p:pic>
+      <p:pic>
+        <p:nvPicPr>
+          <p:cNvPr id="7" name="Picture 6"/>
+          <p:cNvPicPr>
+            <a:picLocks noChangeAspect="1"/>
+          </p:cNvPicPr>
+          <p:nvPr/>
+        </p:nvPicPr>
+        <p:blipFill rotWithShape="1">
+          <a:blip r:embed="rId3"/>
+          <a:srcRect l="16251" t="18958" r="16249" b="9704"/>
+          <a:stretch/>
+        </p:blipFill>
+        <p:spPr>
+          <a:xfrm>
+            <a:off x="6150463" y="2476500"/>
+            <a:ext cx="5983139" cy="3416299"/>
+          </a:xfrm>
+          <a:prstGeom prst="rect">
+            <a:avLst/>
+          </a:prstGeom>
+        </p:spPr>
+      </p:pic>
+      <p:sp>
+        <p:nvSpPr>
+          <p:cNvPr id="12" name="TextBox 11"/>
+          <p:cNvSpPr txBox="1"/>
+          <p:nvPr/>
+        </p:nvSpPr>
+        <p:spPr>
+          <a:xfrm>
+            <a:off x="2628900" y="1701800"/>
+            <a:ext cx="7540206" cy="646331"/>
+          </a:xfrm>
+          <a:prstGeom prst="rect">
+            <a:avLst/>
+          </a:prstGeom>
+          <a:noFill/>
+        </p:spPr>
+        <p:txBody>
+          <a:bodyPr wrap="none" rtlCol="0">
+            <a:spAutoFit/>
+          </a:bodyPr>
           <a:lstStyle/>
           <a:p>
             <a:r>
-              <a:rPr lang="en-US" dirty="0"/>
-              <a:t>[1] Hal Stringer &amp; Annie Wu (2004). “A Teaching GA” [Computer software]. Florida, Orlando: UCF.</a:t>
-            </a:r>
-          </a:p>
-          <a:p>
-            <a:r>
-              <a:rPr lang="en-US" dirty="0"/>
-              <a:t>[2] Applegate, D. L.; Bixby, R. M.; </a:t>
-            </a:r>
-            <a:r>
-              <a:rPr lang="en-US" dirty="0" err="1"/>
-              <a:t>Chvatal</a:t>
-            </a:r>
-            <a:r>
-              <a:rPr lang="en-US" dirty="0"/>
-              <a:t>, V.; Cook, W. J. (2006), “The Traveling Salesman Problem”, ISBN 978-0-691-12993-8.</a:t>
-            </a:r>
-          </a:p>
-          <a:p>
-            <a:r>
-              <a:rPr lang="en-US" dirty="0"/>
-              <a:t>[3] </a:t>
-            </a:r>
-            <a:r>
-              <a:rPr lang="en-US" dirty="0" err="1"/>
-              <a:t>Larranaga</a:t>
-            </a:r>
-            <a:r>
-              <a:rPr lang="en-US" dirty="0"/>
-              <a:t>, P. (1999). “Genetic Algorithms for the Travelling Salesman Problem: A Review of Representations and Operators”. Retrieved February 19, 2020, from </a:t>
-            </a:r>
-            <a:r>
-              <a:rPr lang="en-US" u="sng" dirty="0">
-                <a:hlinkClick r:id="rId2"/>
-              </a:rPr>
-              <a:t>https://link.springer.com/article/10.1023/A:1006529012972</a:t>
-            </a:r>
-            <a:endParaRPr lang="en-US" dirty="0"/>
-          </a:p>
-          <a:p>
-            <a:endParaRPr lang="en-US" dirty="0"/>
+              <a:rPr lang="en-US" sz="3600" dirty="0" smtClean="0"/>
+              <a:t>Ordinal 		    vs 			Path</a:t>
+            </a:r>
+            <a:endParaRPr lang="en-US" sz="3600" dirty="0"/>
           </a:p>
         </p:txBody>
       </p:sp>
     </p:spTree>
     <p:extLst>
       <p:ext uri="{BB962C8B-B14F-4D97-AF65-F5344CB8AC3E}">
-        <p14:creationId xmlns:p14="http://schemas.microsoft.com/office/powerpoint/2010/main" val="2060100588"/>
+        <p14:creationId xmlns:p14="http://schemas.microsoft.com/office/powerpoint/2010/main" val="1325808219"/>
+      </p:ext>
+    </p:extLst>
+  </p:cSld>
+  <p:clrMapOvr>
+    <a:masterClrMapping/>
+  </p:clrMapOvr>
+</p:sld>
+</file>
+
+<file path=ppt/slides/slide9.xml><?xml version="1.0" encoding="utf-8"?>
+<p:sld xmlns:a="http://schemas.openxmlformats.org/drawingml/2006/main" xmlns:r="http://schemas.openxmlformats.org/officeDocument/2006/relationships" xmlns:p="http://schemas.openxmlformats.org/presentationml/2006/main">
+  <p:cSld>
+    <p:spTree>
+      <p:nvGrpSpPr>
+        <p:cNvPr id="1" name=""/>
+        <p:cNvGrpSpPr/>
+        <p:nvPr/>
+      </p:nvGrpSpPr>
+      <p:grpSpPr>
+        <a:xfrm>
+          <a:off x="0" y="0"/>
+          <a:ext cx="0" cy="0"/>
+          <a:chOff x="0" y="0"/>
+          <a:chExt cx="0" cy="0"/>
+        </a:xfrm>
+      </p:grpSpPr>
+      <p:sp>
+        <p:nvSpPr>
+          <p:cNvPr id="6" name="Title 1"/>
+          <p:cNvSpPr txBox="1">
+            <a:spLocks/>
+          </p:cNvSpPr>
+          <p:nvPr/>
+        </p:nvSpPr>
+        <p:spPr>
+          <a:xfrm>
+            <a:off x="1574800" y="520700"/>
+            <a:ext cx="9601200" cy="774700"/>
+          </a:xfrm>
+          <a:prstGeom prst="rect">
+            <a:avLst/>
+          </a:prstGeom>
+        </p:spPr>
+        <p:txBody>
+          <a:bodyPr vert="horz" lIns="91440" tIns="45720" rIns="91440" bIns="45720" rtlCol="0" anchor="t">
+            <a:normAutofit/>
+          </a:bodyPr>
+          <a:lstStyle>
+            <a:lvl1pPr algn="l" defTabSz="914400" rtl="0" eaLnBrk="1" latinLnBrk="0" hangingPunct="1">
+              <a:lnSpc>
+                <a:spcPct val="89000"/>
+              </a:lnSpc>
+              <a:spcBef>
+                <a:spcPct val="0"/>
+              </a:spcBef>
+              <a:buNone/>
+              <a:defRPr sz="4400" kern="1200" baseline="0">
+                <a:solidFill>
+                  <a:schemeClr val="tx2"/>
+                </a:solidFill>
+                <a:latin typeface="+mj-lt"/>
+                <a:ea typeface="+mj-ea"/>
+                <a:cs typeface="+mj-cs"/>
+              </a:defRPr>
+            </a:lvl1pPr>
+          </a:lstStyle>
+          <a:p>
+            <a:r>
+              <a:rPr lang="en-US" dirty="0" smtClean="0"/>
+              <a:t>Best Solution Graphs For Berlin 52</a:t>
+            </a:r>
+            <a:endParaRPr lang="en-US" dirty="0"/>
+          </a:p>
+        </p:txBody>
+      </p:sp>
+      <p:pic>
+        <p:nvPicPr>
+          <p:cNvPr id="11" name="Picture 10"/>
+          <p:cNvPicPr>
+            <a:picLocks noChangeAspect="1"/>
+          </p:cNvPicPr>
+          <p:nvPr/>
+        </p:nvPicPr>
+        <p:blipFill rotWithShape="1">
+          <a:blip r:embed="rId2"/>
+          <a:srcRect l="16250" t="18958" r="16041" b="9704"/>
+          <a:stretch/>
+        </p:blipFill>
+        <p:spPr>
+          <a:xfrm>
+            <a:off x="123334" y="2476500"/>
+            <a:ext cx="6007100" cy="3419426"/>
+          </a:xfrm>
+          <a:prstGeom prst="rect">
+            <a:avLst/>
+          </a:prstGeom>
+        </p:spPr>
+      </p:pic>
+      <p:pic>
+        <p:nvPicPr>
+          <p:cNvPr id="12" name="Picture 11"/>
+          <p:cNvPicPr>
+            <a:picLocks noChangeAspect="1"/>
+          </p:cNvPicPr>
+          <p:nvPr/>
+        </p:nvPicPr>
+        <p:blipFill rotWithShape="1">
+          <a:blip r:embed="rId3"/>
+          <a:srcRect l="16250" t="18572" r="16041" b="9704"/>
+          <a:stretch/>
+        </p:blipFill>
+        <p:spPr>
+          <a:xfrm>
+            <a:off x="6150462" y="2479627"/>
+            <a:ext cx="5983140" cy="3424197"/>
+          </a:xfrm>
+          <a:prstGeom prst="rect">
+            <a:avLst/>
+          </a:prstGeom>
+        </p:spPr>
+      </p:pic>
+      <p:sp>
+        <p:nvSpPr>
+          <p:cNvPr id="15" name="TextBox 14"/>
+          <p:cNvSpPr txBox="1"/>
+          <p:nvPr/>
+        </p:nvSpPr>
+        <p:spPr>
+          <a:xfrm>
+            <a:off x="2628900" y="1701800"/>
+            <a:ext cx="7540206" cy="646331"/>
+          </a:xfrm>
+          <a:prstGeom prst="rect">
+            <a:avLst/>
+          </a:prstGeom>
+          <a:noFill/>
+        </p:spPr>
+        <p:txBody>
+          <a:bodyPr wrap="none" rtlCol="0">
+            <a:spAutoFit/>
+          </a:bodyPr>
+          <a:lstStyle/>
+          <a:p>
+            <a:r>
+              <a:rPr lang="en-US" sz="3600" dirty="0" smtClean="0"/>
+              <a:t>Ordinal 		    vs 			Path</a:t>
+            </a:r>
+            <a:endParaRPr lang="en-US" sz="3600" dirty="0"/>
+          </a:p>
+        </p:txBody>
+      </p:sp>
+    </p:spTree>
+    <p:extLst>
+      <p:ext uri="{BB962C8B-B14F-4D97-AF65-F5344CB8AC3E}">
+        <p14:creationId xmlns:p14="http://schemas.microsoft.com/office/powerpoint/2010/main" val="1734851070"/>
       </p:ext>
     </p:extLst>
   </p:cSld>

</xml_diff>